<commit_message>
new code for analyzing angicart
</commit_message>
<xml_diff>
--- a/papers/ScalingExponentMethodsPresentation.pptx
+++ b/papers/ScalingExponentMethodsPresentation.pptx
@@ -8,10 +8,12 @@
     <p:sldId id="256" r:id="rId2"/>
     <p:sldId id="257" r:id="rId3"/>
     <p:sldId id="258" r:id="rId4"/>
-    <p:sldId id="259" r:id="rId5"/>
-    <p:sldId id="260" r:id="rId6"/>
-    <p:sldId id="262" r:id="rId7"/>
-    <p:sldId id="261" r:id="rId8"/>
+    <p:sldId id="263" r:id="rId5"/>
+    <p:sldId id="259" r:id="rId6"/>
+    <p:sldId id="260" r:id="rId7"/>
+    <p:sldId id="264" r:id="rId8"/>
+    <p:sldId id="262" r:id="rId9"/>
+    <p:sldId id="261" r:id="rId10"/>
   </p:sldIdLst>
   <p:sldSz cx="9144000" cy="6858000" type="screen4x3"/>
   <p:notesSz cx="6858000" cy="9144000"/>
@@ -772,7 +774,7 @@
             <a:fld id="{0D9A0B88-B419-4C40-8CB2-10EC9FBC9A75}" type="datetimeFigureOut">
               <a:rPr lang="en-US" smtClean="0"/>
               <a:pPr/>
-              <a:t>7/5/2016</a:t>
+              <a:t>7/6/2016</a:t>
             </a:fld>
             <a:endParaRPr lang="en-US"/>
           </a:p>
@@ -957,7 +959,7 @@
             <a:fld id="{0D9A0B88-B419-4C40-8CB2-10EC9FBC9A75}" type="datetimeFigureOut">
               <a:rPr lang="en-US" smtClean="0"/>
               <a:pPr/>
-              <a:t>7/5/2016</a:t>
+              <a:t>7/6/2016</a:t>
             </a:fld>
             <a:endParaRPr lang="en-US"/>
           </a:p>
@@ -1134,7 +1136,7 @@
             <a:fld id="{0D9A0B88-B419-4C40-8CB2-10EC9FBC9A75}" type="datetimeFigureOut">
               <a:rPr lang="en-US" smtClean="0"/>
               <a:pPr/>
-              <a:t>7/5/2016</a:t>
+              <a:t>7/6/2016</a:t>
             </a:fld>
             <a:endParaRPr lang="en-US"/>
           </a:p>
@@ -1301,7 +1303,7 @@
             <a:fld id="{0D9A0B88-B419-4C40-8CB2-10EC9FBC9A75}" type="datetimeFigureOut">
               <a:rPr lang="en-US" smtClean="0"/>
               <a:pPr/>
-              <a:t>7/5/2016</a:t>
+              <a:t>7/6/2016</a:t>
             </a:fld>
             <a:endParaRPr lang="en-US"/>
           </a:p>
@@ -1524,7 +1526,7 @@
             <a:fld id="{0D9A0B88-B419-4C40-8CB2-10EC9FBC9A75}" type="datetimeFigureOut">
               <a:rPr lang="en-US" smtClean="0"/>
               <a:pPr/>
-              <a:t>7/5/2016</a:t>
+              <a:t>7/6/2016</a:t>
             </a:fld>
             <a:endParaRPr lang="en-US"/>
           </a:p>
@@ -1785,7 +1787,7 @@
             <a:fld id="{0D9A0B88-B419-4C40-8CB2-10EC9FBC9A75}" type="datetimeFigureOut">
               <a:rPr lang="en-US" smtClean="0"/>
               <a:pPr/>
-              <a:t>7/5/2016</a:t>
+              <a:t>7/6/2016</a:t>
             </a:fld>
             <a:endParaRPr lang="en-US"/>
           </a:p>
@@ -2191,7 +2193,7 @@
             <a:fld id="{0D9A0B88-B419-4C40-8CB2-10EC9FBC9A75}" type="datetimeFigureOut">
               <a:rPr lang="en-US" smtClean="0"/>
               <a:pPr/>
-              <a:t>7/5/2016</a:t>
+              <a:t>7/6/2016</a:t>
             </a:fld>
             <a:endParaRPr lang="en-US"/>
           </a:p>
@@ -2324,7 +2326,7 @@
             <a:fld id="{0D9A0B88-B419-4C40-8CB2-10EC9FBC9A75}" type="datetimeFigureOut">
               <a:rPr lang="en-US" smtClean="0"/>
               <a:pPr/>
-              <a:t>7/5/2016</a:t>
+              <a:t>7/6/2016</a:t>
             </a:fld>
             <a:endParaRPr lang="en-US"/>
           </a:p>
@@ -2426,7 +2428,7 @@
             <a:fld id="{0D9A0B88-B419-4C40-8CB2-10EC9FBC9A75}" type="datetimeFigureOut">
               <a:rPr lang="en-US" smtClean="0"/>
               <a:pPr/>
-              <a:t>7/5/2016</a:t>
+              <a:t>7/6/2016</a:t>
             </a:fld>
             <a:endParaRPr lang="en-US"/>
           </a:p>
@@ -2673,7 +2675,7 @@
             <a:fld id="{0D9A0B88-B419-4C40-8CB2-10EC9FBC9A75}" type="datetimeFigureOut">
               <a:rPr lang="en-US" smtClean="0"/>
               <a:pPr/>
-              <a:t>7/5/2016</a:t>
+              <a:t>7/6/2016</a:t>
             </a:fld>
             <a:endParaRPr lang="en-US"/>
           </a:p>
@@ -2919,7 +2921,7 @@
             <a:fld id="{0D9A0B88-B419-4C40-8CB2-10EC9FBC9A75}" type="datetimeFigureOut">
               <a:rPr lang="en-US" smtClean="0"/>
               <a:pPr/>
-              <a:t>7/5/2016</a:t>
+              <a:t>7/6/2016</a:t>
             </a:fld>
             <a:endParaRPr lang="en-US"/>
           </a:p>
@@ -3745,7 +3747,7 @@
             <a:fld id="{0D9A0B88-B419-4C40-8CB2-10EC9FBC9A75}" type="datetimeFigureOut">
               <a:rPr lang="en-US" smtClean="0"/>
               <a:pPr/>
-              <a:t>7/5/2016</a:t>
+              <a:t>7/6/2016</a:t>
             </a:fld>
             <a:endParaRPr lang="en-US"/>
           </a:p>
@@ -4368,7 +4370,7 @@
           <a:p>
             <a:r>
               <a:rPr lang="en-US" dirty="0" smtClean="0"/>
-              <a:t>Scaling exponent b using Method 1</a:t>
+              <a:t>Scaling exponent a using Method 3</a:t>
             </a:r>
             <a:endParaRPr lang="en-US" dirty="0"/>
           </a:p>
@@ -4376,7 +4378,7 @@
       </p:sp>
       <p:pic>
         <p:nvPicPr>
-          <p:cNvPr id="5" name="Content Placeholder 4" descr="length_method1.jpg"/>
+          <p:cNvPr id="5" name="Content Placeholder 4" descr="r_method3.jpg"/>
           <p:cNvPicPr>
             <a:picLocks noGrp="1" noChangeAspect="1"/>
           </p:cNvPicPr>
@@ -4392,8 +4394,8 @@
         </p:blipFill>
         <p:spPr>
           <a:xfrm>
-            <a:off x="1676400" y="2209800"/>
-            <a:ext cx="5486400" cy="4114800"/>
+            <a:off x="1981200" y="2209800"/>
+            <a:ext cx="5715000" cy="4286250"/>
           </a:xfrm>
         </p:spPr>
       </p:pic>
@@ -4439,6 +4441,77 @@
           <a:p>
             <a:r>
               <a:rPr lang="en-US" dirty="0" smtClean="0"/>
+              <a:t>Scaling exponent b using Method 1</a:t>
+            </a:r>
+            <a:endParaRPr lang="en-US" dirty="0"/>
+          </a:p>
+        </p:txBody>
+      </p:sp>
+      <p:pic>
+        <p:nvPicPr>
+          <p:cNvPr id="5" name="Content Placeholder 4" descr="length_method1.jpg"/>
+          <p:cNvPicPr>
+            <a:picLocks noGrp="1" noChangeAspect="1"/>
+          </p:cNvPicPr>
+          <p:nvPr>
+            <p:ph idx="1"/>
+          </p:nvPr>
+        </p:nvPicPr>
+        <p:blipFill>
+          <a:blip r:embed="rId2" cstate="print"/>
+          <a:stretch>
+            <a:fillRect/>
+          </a:stretch>
+        </p:blipFill>
+        <p:spPr>
+          <a:xfrm>
+            <a:off x="1676400" y="2209800"/>
+            <a:ext cx="5486400" cy="4114800"/>
+          </a:xfrm>
+        </p:spPr>
+      </p:pic>
+    </p:spTree>
+  </p:cSld>
+  <p:clrMapOvr>
+    <a:masterClrMapping/>
+  </p:clrMapOvr>
+</p:sld>
+</file>
+
+<file path=ppt/slides/slide6.xml><?xml version="1.0" encoding="utf-8"?>
+<p:sld xmlns:a="http://schemas.openxmlformats.org/drawingml/2006/main" xmlns:r="http://schemas.openxmlformats.org/officeDocument/2006/relationships" xmlns:p="http://schemas.openxmlformats.org/presentationml/2006/main">
+  <p:cSld>
+    <p:spTree>
+      <p:nvGrpSpPr>
+        <p:cNvPr id="1" name=""/>
+        <p:cNvGrpSpPr/>
+        <p:nvPr/>
+      </p:nvGrpSpPr>
+      <p:grpSpPr>
+        <a:xfrm>
+          <a:off x="0" y="0"/>
+          <a:ext cx="0" cy="0"/>
+          <a:chOff x="0" y="0"/>
+          <a:chExt cx="0" cy="0"/>
+        </a:xfrm>
+      </p:grpSpPr>
+      <p:sp>
+        <p:nvSpPr>
+          <p:cNvPr id="2" name="Title 1"/>
+          <p:cNvSpPr>
+            <a:spLocks noGrp="1"/>
+          </p:cNvSpPr>
+          <p:nvPr>
+            <p:ph type="title"/>
+          </p:nvPr>
+        </p:nvSpPr>
+        <p:spPr/>
+        <p:txBody>
+          <a:bodyPr/>
+          <a:lstStyle/>
+          <a:p>
+            <a:r>
+              <a:rPr lang="en-US" dirty="0" smtClean="0"/>
               <a:t>Scaling exponent b using Method 3</a:t>
             </a:r>
             <a:endParaRPr lang="en-US" dirty="0"/>
@@ -4476,7 +4549,78 @@
 </p:sld>
 </file>
 
-<file path=ppt/slides/slide6.xml><?xml version="1.0" encoding="utf-8"?>
+<file path=ppt/slides/slide7.xml><?xml version="1.0" encoding="utf-8"?>
+<p:sld xmlns:a="http://schemas.openxmlformats.org/drawingml/2006/main" xmlns:r="http://schemas.openxmlformats.org/officeDocument/2006/relationships" xmlns:p="http://schemas.openxmlformats.org/presentationml/2006/main">
+  <p:cSld>
+    <p:spTree>
+      <p:nvGrpSpPr>
+        <p:cNvPr id="1" name=""/>
+        <p:cNvGrpSpPr/>
+        <p:nvPr/>
+      </p:nvGrpSpPr>
+      <p:grpSpPr>
+        <a:xfrm>
+          <a:off x="0" y="0"/>
+          <a:ext cx="0" cy="0"/>
+          <a:chOff x="0" y="0"/>
+          <a:chExt cx="0" cy="0"/>
+        </a:xfrm>
+      </p:grpSpPr>
+      <p:sp>
+        <p:nvSpPr>
+          <p:cNvPr id="2" name="Title 1"/>
+          <p:cNvSpPr>
+            <a:spLocks noGrp="1"/>
+          </p:cNvSpPr>
+          <p:nvPr>
+            <p:ph type="title"/>
+          </p:nvPr>
+        </p:nvSpPr>
+        <p:spPr/>
+        <p:txBody>
+          <a:bodyPr/>
+          <a:lstStyle/>
+          <a:p>
+            <a:r>
+              <a:rPr lang="en-US" dirty="0" smtClean="0"/>
+              <a:t>Scaling exponent b using Method 3</a:t>
+            </a:r>
+            <a:endParaRPr lang="en-US" dirty="0"/>
+          </a:p>
+        </p:txBody>
+      </p:sp>
+      <p:pic>
+        <p:nvPicPr>
+          <p:cNvPr id="5" name="Content Placeholder 4" descr="l_method3.jpg"/>
+          <p:cNvPicPr>
+            <a:picLocks noGrp="1" noChangeAspect="1"/>
+          </p:cNvPicPr>
+          <p:nvPr>
+            <p:ph idx="1"/>
+          </p:nvPr>
+        </p:nvPicPr>
+        <p:blipFill>
+          <a:blip r:embed="rId2" cstate="print"/>
+          <a:stretch>
+            <a:fillRect/>
+          </a:stretch>
+        </p:blipFill>
+        <p:spPr>
+          <a:xfrm>
+            <a:off x="1905000" y="2133600"/>
+            <a:ext cx="5410200" cy="4057650"/>
+          </a:xfrm>
+        </p:spPr>
+      </p:pic>
+    </p:spTree>
+  </p:cSld>
+  <p:clrMapOvr>
+    <a:masterClrMapping/>
+  </p:clrMapOvr>
+</p:sld>
+</file>
+
+<file path=ppt/slides/slide8.xml><?xml version="1.0" encoding="utf-8"?>
 <p:sld xmlns:a="http://schemas.openxmlformats.org/drawingml/2006/main" xmlns:r="http://schemas.openxmlformats.org/officeDocument/2006/relationships" xmlns:p="http://schemas.openxmlformats.org/presentationml/2006/main">
   <p:cSld>
     <p:spTree>
@@ -4525,7 +4669,7 @@
 </p:sld>
 </file>
 
-<file path=ppt/slides/slide7.xml><?xml version="1.0" encoding="utf-8"?>
+<file path=ppt/slides/slide9.xml><?xml version="1.0" encoding="utf-8"?>
 <p:sld xmlns:a="http://schemas.openxmlformats.org/drawingml/2006/main" xmlns:r="http://schemas.openxmlformats.org/officeDocument/2006/relationships" xmlns:p="http://schemas.openxmlformats.org/presentationml/2006/main">
   <p:cSld>
     <p:spTree>

</xml_diff>

<commit_message>
new code to compare
</commit_message>
<xml_diff>
--- a/papers/ScalingExponentMethodsPresentation.pptx
+++ b/papers/ScalingExponentMethodsPresentation.pptx
@@ -774,7 +774,7 @@
             <a:fld id="{0D9A0B88-B419-4C40-8CB2-10EC9FBC9A75}" type="datetimeFigureOut">
               <a:rPr lang="en-US" smtClean="0"/>
               <a:pPr/>
-              <a:t>7/6/2016</a:t>
+              <a:t>7/7/2016</a:t>
             </a:fld>
             <a:endParaRPr lang="en-US"/>
           </a:p>
@@ -959,7 +959,7 @@
             <a:fld id="{0D9A0B88-B419-4C40-8CB2-10EC9FBC9A75}" type="datetimeFigureOut">
               <a:rPr lang="en-US" smtClean="0"/>
               <a:pPr/>
-              <a:t>7/6/2016</a:t>
+              <a:t>7/7/2016</a:t>
             </a:fld>
             <a:endParaRPr lang="en-US"/>
           </a:p>
@@ -1136,7 +1136,7 @@
             <a:fld id="{0D9A0B88-B419-4C40-8CB2-10EC9FBC9A75}" type="datetimeFigureOut">
               <a:rPr lang="en-US" smtClean="0"/>
               <a:pPr/>
-              <a:t>7/6/2016</a:t>
+              <a:t>7/7/2016</a:t>
             </a:fld>
             <a:endParaRPr lang="en-US"/>
           </a:p>
@@ -1303,7 +1303,7 @@
             <a:fld id="{0D9A0B88-B419-4C40-8CB2-10EC9FBC9A75}" type="datetimeFigureOut">
               <a:rPr lang="en-US" smtClean="0"/>
               <a:pPr/>
-              <a:t>7/6/2016</a:t>
+              <a:t>7/7/2016</a:t>
             </a:fld>
             <a:endParaRPr lang="en-US"/>
           </a:p>
@@ -1526,7 +1526,7 @@
             <a:fld id="{0D9A0B88-B419-4C40-8CB2-10EC9FBC9A75}" type="datetimeFigureOut">
               <a:rPr lang="en-US" smtClean="0"/>
               <a:pPr/>
-              <a:t>7/6/2016</a:t>
+              <a:t>7/7/2016</a:t>
             </a:fld>
             <a:endParaRPr lang="en-US"/>
           </a:p>
@@ -1787,7 +1787,7 @@
             <a:fld id="{0D9A0B88-B419-4C40-8CB2-10EC9FBC9A75}" type="datetimeFigureOut">
               <a:rPr lang="en-US" smtClean="0"/>
               <a:pPr/>
-              <a:t>7/6/2016</a:t>
+              <a:t>7/7/2016</a:t>
             </a:fld>
             <a:endParaRPr lang="en-US"/>
           </a:p>
@@ -2193,7 +2193,7 @@
             <a:fld id="{0D9A0B88-B419-4C40-8CB2-10EC9FBC9A75}" type="datetimeFigureOut">
               <a:rPr lang="en-US" smtClean="0"/>
               <a:pPr/>
-              <a:t>7/6/2016</a:t>
+              <a:t>7/7/2016</a:t>
             </a:fld>
             <a:endParaRPr lang="en-US"/>
           </a:p>
@@ -2326,7 +2326,7 @@
             <a:fld id="{0D9A0B88-B419-4C40-8CB2-10EC9FBC9A75}" type="datetimeFigureOut">
               <a:rPr lang="en-US" smtClean="0"/>
               <a:pPr/>
-              <a:t>7/6/2016</a:t>
+              <a:t>7/7/2016</a:t>
             </a:fld>
             <a:endParaRPr lang="en-US"/>
           </a:p>
@@ -2428,7 +2428,7 @@
             <a:fld id="{0D9A0B88-B419-4C40-8CB2-10EC9FBC9A75}" type="datetimeFigureOut">
               <a:rPr lang="en-US" smtClean="0"/>
               <a:pPr/>
-              <a:t>7/6/2016</a:t>
+              <a:t>7/7/2016</a:t>
             </a:fld>
             <a:endParaRPr lang="en-US"/>
           </a:p>
@@ -2675,7 +2675,7 @@
             <a:fld id="{0D9A0B88-B419-4C40-8CB2-10EC9FBC9A75}" type="datetimeFigureOut">
               <a:rPr lang="en-US" smtClean="0"/>
               <a:pPr/>
-              <a:t>7/6/2016</a:t>
+              <a:t>7/7/2016</a:t>
             </a:fld>
             <a:endParaRPr lang="en-US"/>
           </a:p>
@@ -2921,7 +2921,7 @@
             <a:fld id="{0D9A0B88-B419-4C40-8CB2-10EC9FBC9A75}" type="datetimeFigureOut">
               <a:rPr lang="en-US" smtClean="0"/>
               <a:pPr/>
-              <a:t>7/6/2016</a:t>
+              <a:t>7/7/2016</a:t>
             </a:fld>
             <a:endParaRPr lang="en-US"/>
           </a:p>
@@ -3747,7 +3747,7 @@
             <a:fld id="{0D9A0B88-B419-4C40-8CB2-10EC9FBC9A75}" type="datetimeFigureOut">
               <a:rPr lang="en-US" smtClean="0"/>
               <a:pPr/>
-              <a:t>7/6/2016</a:t>
+              <a:t>7/7/2016</a:t>
             </a:fld>
             <a:endParaRPr lang="en-US"/>
           </a:p>
@@ -4940,11 +4940,11 @@
                     <a:p>
                       <a:r>
                         <a:rPr lang="en-US" sz="1400" dirty="0" smtClean="0"/>
-                        <a:t>Mouse</a:t>
+                        <a:t>Sample</a:t>
                       </a:r>
                       <a:r>
                         <a:rPr lang="en-US" sz="1400" baseline="0" dirty="0" smtClean="0"/>
-                        <a:t> lung</a:t>
+                        <a:t> Data</a:t>
                       </a:r>
                       <a:endParaRPr lang="en-US" sz="1400" dirty="0"/>
                     </a:p>
@@ -4958,7 +4958,7 @@
                     <a:p>
                       <a:r>
                         <a:rPr lang="en-US" sz="1400" dirty="0" smtClean="0"/>
-                        <a:t>X</a:t>
+                        <a:t> 0.1198</a:t>
                       </a:r>
                       <a:endParaRPr lang="en-US" sz="1400" dirty="0"/>
                     </a:p>
@@ -4972,7 +4972,7 @@
                     <a:p>
                       <a:r>
                         <a:rPr lang="en-US" sz="1400" dirty="0" smtClean="0"/>
-                        <a:t>X</a:t>
+                        <a:t>0.1932</a:t>
                       </a:r>
                       <a:endParaRPr lang="en-US" sz="1400" dirty="0"/>
                     </a:p>
@@ -4986,7 +4986,7 @@
                     <a:p>
                       <a:r>
                         <a:rPr lang="en-US" sz="1400" dirty="0" smtClean="0"/>
-                        <a:t>X</a:t>
+                        <a:t>0.0807</a:t>
                       </a:r>
                       <a:endParaRPr lang="en-US" sz="1400" dirty="0"/>
                     </a:p>
@@ -5000,7 +5000,7 @@
                     <a:p>
                       <a:r>
                         <a:rPr lang="en-US" sz="1400" dirty="0" smtClean="0"/>
-                        <a:t>X</a:t>
+                        <a:t> 0.0659</a:t>
                       </a:r>
                       <a:endParaRPr lang="en-US" sz="1400" dirty="0"/>
                     </a:p>
@@ -5014,6 +5014,10 @@
                     <a:bodyPr/>
                     <a:lstStyle/>
                     <a:p>
+                      <a:r>
+                        <a:rPr lang="en-US" sz="1400" dirty="0" smtClean="0"/>
+                        <a:t>Sample </a:t>
+                      </a:r>
                       <a:endParaRPr lang="en-US" sz="1400" dirty="0"/>
                     </a:p>
                   </a:txBody>

</xml_diff>